<commit_message>
Kosmetik in den Folien
</commit_message>
<xml_diff>
--- a/Termin_2/folien/Termin_2_Populationsmodelle.pptx
+++ b/Termin_2/folien/Termin_2_Populationsmodelle.pptx
@@ -26,14 +26,14 @@
   <p:notesSz cx="7099300" cy="9601200"/>
   <p:embeddedFontLst>
     <p:embeddedFont>
-      <p:font typeface="Calibri" panose="020F0502020204030204" pitchFamily="34" charset="0"/>
+      <p:font typeface="Calibri" pitchFamily="34" charset="0"/>
       <p:regular r:id="rId14"/>
       <p:bold r:id="rId15"/>
       <p:italic r:id="rId16"/>
       <p:boldItalic r:id="rId17"/>
     </p:embeddedFont>
     <p:embeddedFont>
-      <p:font typeface="MV Boli" panose="02000500030200090000" pitchFamily="2" charset="0"/>
+      <p:font typeface="MV Boli" pitchFamily="2" charset="0"/>
       <p:regular r:id="rId18"/>
     </p:embeddedFont>
   </p:embeddedFontLst>
@@ -396,7 +396,7 @@
     </p:spTree>
     <p:extLst>
       <p:ext uri="{BB962C8B-B14F-4D97-AF65-F5344CB8AC3E}">
-        <p14:creationId xmlns:p14="http://schemas.microsoft.com/office/powerpoint/2010/main" val="1882660213"/>
+        <p14:creationId xmlns:p14="http://schemas.microsoft.com/office/powerpoint/2010/main" xmlns="" val="1882660213"/>
       </p:ext>
     </p:extLst>
   </p:cSld>
@@ -699,7 +699,7 @@
     </p:spTree>
     <p:extLst>
       <p:ext uri="{BB962C8B-B14F-4D97-AF65-F5344CB8AC3E}">
-        <p14:creationId xmlns:p14="http://schemas.microsoft.com/office/powerpoint/2010/main" val="2781074432"/>
+        <p14:creationId xmlns:p14="http://schemas.microsoft.com/office/powerpoint/2010/main" xmlns="" val="2781074432"/>
       </p:ext>
     </p:extLst>
   </p:cSld>
@@ -1528,16 +1528,109 @@
               <a:rPr lang="en-GB" smtClean="0">
                 <a:latin typeface="Arial" charset="0"/>
               </a:rPr>
-              <a:t>diagnostisch für exponentielles/ geometrisches Wachstum: halb-logarithmische Darstellung</a:t>
-            </a:r>
+              <a:t>diagnostisch</a:t>
+            </a:r>
+            <a:r>
+              <a:rPr lang="en-GB" dirty="0" smtClean="0">
+                <a:latin typeface="Arial" charset="0"/>
+              </a:rPr>
+              <a:t> </a:t>
+            </a:r>
+            <a:r>
+              <a:rPr lang="en-GB" dirty="0" err="1" smtClean="0">
+                <a:latin typeface="Arial" charset="0"/>
+              </a:rPr>
+              <a:t>für</a:t>
+            </a:r>
+            <a:r>
+              <a:rPr lang="en-GB" dirty="0" smtClean="0">
+                <a:latin typeface="Arial" charset="0"/>
+              </a:rPr>
+              <a:t> </a:t>
+            </a:r>
+            <a:r>
+              <a:rPr lang="en-GB" dirty="0" err="1" smtClean="0">
+                <a:latin typeface="Arial" charset="0"/>
+              </a:rPr>
+              <a:t>exponentielles</a:t>
+            </a:r>
+            <a:r>
+              <a:rPr lang="en-GB" dirty="0" smtClean="0">
+                <a:latin typeface="Arial" charset="0"/>
+              </a:rPr>
+              <a:t>/ </a:t>
+            </a:r>
+            <a:r>
+              <a:rPr lang="en-GB" dirty="0" err="1" smtClean="0">
+                <a:latin typeface="Arial" charset="0"/>
+              </a:rPr>
+              <a:t>geometrisches</a:t>
+            </a:r>
+            <a:r>
+              <a:rPr lang="en-GB" dirty="0" smtClean="0">
+                <a:latin typeface="Arial" charset="0"/>
+              </a:rPr>
+              <a:t> </a:t>
+            </a:r>
+            <a:r>
+              <a:rPr lang="en-GB" dirty="0" err="1" smtClean="0">
+                <a:latin typeface="Arial" charset="0"/>
+              </a:rPr>
+              <a:t>Wachstum</a:t>
+            </a:r>
+            <a:r>
+              <a:rPr lang="en-GB" dirty="0" smtClean="0">
+                <a:latin typeface="Arial" charset="0"/>
+              </a:rPr>
+              <a:t>: </a:t>
+            </a:r>
+            <a:r>
+              <a:rPr lang="en-GB" dirty="0" err="1" smtClean="0">
+                <a:latin typeface="Arial" charset="0"/>
+              </a:rPr>
+              <a:t>halb-logarithmische</a:t>
+            </a:r>
+            <a:r>
+              <a:rPr lang="en-GB" dirty="0" smtClean="0">
+                <a:latin typeface="Arial" charset="0"/>
+              </a:rPr>
+              <a:t> </a:t>
+            </a:r>
+            <a:r>
+              <a:rPr lang="en-GB" dirty="0" err="1" smtClean="0">
+                <a:latin typeface="Arial" charset="0"/>
+              </a:rPr>
+              <a:t>Darstellung</a:t>
+            </a:r>
+            <a:endParaRPr lang="en-GB" dirty="0" smtClean="0">
+              <a:latin typeface="Arial" charset="0"/>
+            </a:endParaRPr>
           </a:p>
           <a:p>
             <a:pPr eaLnBrk="1" hangingPunct="1"/>
             <a:r>
-              <a:rPr lang="en-GB" smtClean="0">
+              <a:rPr lang="en-GB" dirty="0" err="1" smtClean="0">
                 <a:latin typeface="Arial" charset="0"/>
               </a:rPr>
-              <a:t>Wachstumsrate UNABHÄNGIG von Populationsgröße!</a:t>
+              <a:t>Wachstumsrate</a:t>
+            </a:r>
+            <a:r>
+              <a:rPr lang="en-GB" dirty="0" smtClean="0">
+                <a:latin typeface="Arial" charset="0"/>
+              </a:rPr>
+              <a:t> UNABHÄNGIG von </a:t>
+            </a:r>
+            <a:r>
+              <a:rPr lang="en-GB" dirty="0" err="1" smtClean="0">
+                <a:latin typeface="Arial" charset="0"/>
+              </a:rPr>
+              <a:t>Populationsgröße</a:t>
+            </a:r>
+            <a:r>
+              <a:rPr lang="en-GB" dirty="0" smtClean="0">
+                <a:latin typeface="Arial" charset="0"/>
+              </a:rPr>
+              <a:t>!</a:t>
             </a:r>
           </a:p>
         </p:txBody>
@@ -2166,7 +2259,7 @@
             <a:fld id="{FC5D9B2F-9BCF-4571-A5AD-AC2822C7B5AB}" type="datetimeFigureOut">
               <a:rPr lang="en-GB" smtClean="0"/>
               <a:pPr/>
-              <a:t>13/12/2017</a:t>
+              <a:t>11/12/2018</a:t>
             </a:fld>
             <a:endParaRPr lang="en-GB"/>
           </a:p>
@@ -4332,7 +4425,27 @@
                 <a:latin typeface="Calibri" pitchFamily="34" charset="0"/>
                 <a:cs typeface="+mn-cs"/>
               </a:rPr>
-              <a:t>Seminar Modellierung &amp; Datenanalyse, Wintersemester 2017/18                       #</a:t>
+              <a:t>Seminar Modellierung &amp; Datenanalyse, Wintersemester </a:t>
+            </a:r>
+            <a:r>
+              <a:rPr lang="de-DE" noProof="0" dirty="0" smtClean="0">
+                <a:solidFill>
+                  <a:schemeClr val="bg1"/>
+                </a:solidFill>
+                <a:latin typeface="Calibri" pitchFamily="34" charset="0"/>
+                <a:cs typeface="+mn-cs"/>
+              </a:rPr>
+              <a:t>2018/19                       </a:t>
+            </a:r>
+            <a:r>
+              <a:rPr lang="de-DE" noProof="0" dirty="0" smtClean="0">
+                <a:solidFill>
+                  <a:schemeClr val="bg1"/>
+                </a:solidFill>
+                <a:latin typeface="Calibri" pitchFamily="34" charset="0"/>
+                <a:cs typeface="+mn-cs"/>
+              </a:rPr>
+              <a:t>#</a:t>
             </a:r>
             <a:fld id="{19621714-58BB-457A-826B-841F6E217726}" type="slidenum">
               <a:rPr lang="de-DE" noProof="0" smtClean="0">
@@ -4862,8 +4975,17 @@
               <a:rPr lang="de-DE" sz="3600" dirty="0" smtClean="0">
                 <a:latin typeface="Calibri" pitchFamily="34" charset="0"/>
               </a:rPr>
-              <a:t>Wintersemester 2017/18</a:t>
-            </a:r>
+              <a:t>Wintersemester </a:t>
+            </a:r>
+            <a:r>
+              <a:rPr lang="de-DE" sz="3600" dirty="0" smtClean="0">
+                <a:latin typeface="Calibri" pitchFamily="34" charset="0"/>
+              </a:rPr>
+              <a:t>2018/19</a:t>
+            </a:r>
+            <a:endParaRPr lang="de-DE" sz="3600" dirty="0" smtClean="0">
+              <a:latin typeface="Calibri" pitchFamily="34" charset="0"/>
+            </a:endParaRPr>
           </a:p>
           <a:p>
             <a:pPr lvl="0" algn="ctr">
@@ -5397,7 +5519,7 @@
                   <a:schemeClr val="bg1"/>
                 </a:solidFill>
               </a:rPr>
-              <a:t>tinyurl.com/eim-1718-2</a:t>
+              <a:t>tinyurl.com/eim-1819-2</a:t>
             </a:r>
             <a:endParaRPr lang="en-GB" sz="2800" dirty="0">
               <a:solidFill>
@@ -5416,7 +5538,7 @@
         <p:spPr>
           <a:xfrm>
             <a:off x="4355976" y="6021288"/>
-            <a:ext cx="2859052" cy="523220"/>
+            <a:ext cx="3286477" cy="523220"/>
           </a:xfrm>
           <a:prstGeom prst="rect">
             <a:avLst/>
@@ -5434,7 +5556,23 @@
                   <a:schemeClr val="bg1"/>
                 </a:solidFill>
               </a:rPr>
-              <a:t>11:15 – 9.1.2018</a:t>
+              <a:t>15:15 </a:t>
+            </a:r>
+            <a:r>
+              <a:rPr lang="en-GB" sz="2800" dirty="0" smtClean="0">
+                <a:solidFill>
+                  <a:schemeClr val="bg1"/>
+                </a:solidFill>
+              </a:rPr>
+              <a:t>– </a:t>
+            </a:r>
+            <a:r>
+              <a:rPr lang="en-GB" sz="2800" dirty="0" smtClean="0">
+                <a:solidFill>
+                  <a:schemeClr val="bg1"/>
+                </a:solidFill>
+              </a:rPr>
+              <a:t>18.12.2018</a:t>
             </a:r>
             <a:endParaRPr lang="en-GB" sz="2800" dirty="0">
               <a:solidFill>
@@ -6257,7 +6395,7 @@
                   <a:schemeClr val="bg1"/>
                 </a:solidFill>
               </a:rPr>
-              <a:t>tinyurl.com/eim-1718-2</a:t>
+              <a:t>tinyurl.com/eim-1819-2</a:t>
             </a:r>
             <a:endParaRPr lang="en-GB" sz="2800" dirty="0">
               <a:solidFill>
@@ -6276,7 +6414,7 @@
         <p:spPr>
           <a:xfrm>
             <a:off x="4355976" y="6021288"/>
-            <a:ext cx="2859052" cy="523220"/>
+            <a:ext cx="3286477" cy="523220"/>
           </a:xfrm>
           <a:prstGeom prst="rect">
             <a:avLst/>
@@ -6294,7 +6432,23 @@
                   <a:schemeClr val="bg1"/>
                 </a:solidFill>
               </a:rPr>
-              <a:t>11:15 – 9.1.2018</a:t>
+              <a:t>15:15 </a:t>
+            </a:r>
+            <a:r>
+              <a:rPr lang="en-GB" sz="2800" dirty="0" smtClean="0">
+                <a:solidFill>
+                  <a:schemeClr val="bg1"/>
+                </a:solidFill>
+              </a:rPr>
+              <a:t>– </a:t>
+            </a:r>
+            <a:r>
+              <a:rPr lang="en-GB" sz="2800" dirty="0" smtClean="0">
+                <a:solidFill>
+                  <a:schemeClr val="bg1"/>
+                </a:solidFill>
+              </a:rPr>
+              <a:t>18.12.2018</a:t>
             </a:r>
             <a:endParaRPr lang="en-GB" sz="2800" dirty="0">
               <a:solidFill>
@@ -7035,82 +7189,9 @@
         </p:xfrm>
         <a:graphic>
           <a:graphicData uri="http://schemas.openxmlformats.org/presentationml/2006/ole">
-            <mc:AlternateContent xmlns:mc="http://schemas.openxmlformats.org/markup-compatibility/2006">
-              <mc:Choice xmlns:v="urn:schemas-microsoft-com:vml" Requires="v">
-                <p:oleObj spid="_x0000_s7173" name="Formel" r:id="rId4" imgW="190335" imgH="177646" progId="Equation.3">
-                  <p:embed/>
-                </p:oleObj>
-              </mc:Choice>
-              <mc:Fallback>
-                <p:oleObj name="Formel" r:id="rId4" imgW="190335" imgH="177646" progId="Equation.3">
-                  <p:embed/>
-                  <p:pic>
-                    <p:nvPicPr>
-                      <p:cNvPr id="0" name="Picture 3"/>
-                      <p:cNvPicPr>
-                        <a:picLocks noChangeAspect="1" noChangeArrowheads="1"/>
-                      </p:cNvPicPr>
-                      <p:nvPr/>
-                    </p:nvPicPr>
-                    <p:blipFill>
-                      <a:blip r:embed="rId5">
-                        <a:extLst>
-                          <a:ext uri="{28A0092B-C50C-407E-A947-70E740481C1C}">
-                            <a14:useLocalDpi xmlns:a14="http://schemas.microsoft.com/office/drawing/2010/main" val="0"/>
-                          </a:ext>
-                        </a:extLst>
-                      </a:blip>
-                      <a:srcRect/>
-                      <a:stretch>
-                        <a:fillRect/>
-                      </a:stretch>
-                    </p:blipFill>
-                    <p:spPr bwMode="auto">
-                      <a:xfrm>
-                        <a:off x="3990975" y="4997450"/>
-                        <a:ext cx="496888" cy="463550"/>
-                      </a:xfrm>
-                      <a:prstGeom prst="rect">
-                        <a:avLst/>
-                      </a:prstGeom>
-                      <a:noFill/>
-                      <a:ln>
-                        <a:noFill/>
-                      </a:ln>
-                      <a:effectLst/>
-                      <a:extLst>
-                        <a:ext uri="{909E8E84-426E-40DD-AFC4-6F175D3DCCD1}">
-                          <a14:hiddenFill xmlns:a14="http://schemas.microsoft.com/office/drawing/2010/main">
-                            <a:solidFill>
-                              <a:schemeClr val="accent1"/>
-                            </a:solidFill>
-                          </a14:hiddenFill>
-                        </a:ext>
-                        <a:ext uri="{91240B29-F687-4F45-9708-019B960494DF}">
-                          <a14:hiddenLine xmlns:a14="http://schemas.microsoft.com/office/drawing/2010/main" w="9525">
-                            <a:solidFill>
-                              <a:schemeClr val="tx1"/>
-                            </a:solidFill>
-                            <a:miter lim="800000"/>
-                            <a:headEnd/>
-                            <a:tailEnd/>
-                          </a14:hiddenLine>
-                        </a:ext>
-                        <a:ext uri="{AF507438-7753-43E0-B8FC-AC1667EBCBE1}">
-                          <a14:hiddenEffects xmlns:a14="http://schemas.microsoft.com/office/drawing/2010/main">
-                            <a:effectLst>
-                              <a:outerShdw dist="35921" dir="2700000" algn="ctr" rotWithShape="0">
-                                <a:schemeClr val="bg2"/>
-                              </a:outerShdw>
-                            </a:effectLst>
-                          </a14:hiddenEffects>
-                        </a:ext>
-                      </a:extLst>
-                    </p:spPr>
-                  </p:pic>
-                </p:oleObj>
-              </mc:Fallback>
-            </mc:AlternateContent>
+            <p:oleObj spid="_x0000_s7173" name="Formel" r:id="rId4" imgW="190335" imgH="177646" progId="Equation.3">
+              <p:embed/>
+            </p:oleObj>
           </a:graphicData>
         </a:graphic>
       </p:graphicFrame>
@@ -17882,7 +17963,7 @@
         <p:spPr bwMode="auto">
           <a:xfrm>
             <a:off x="5148064" y="3666703"/>
-            <a:ext cx="3995936" cy="1296144"/>
+            <a:ext cx="3869476" cy="1296144"/>
           </a:xfrm>
           <a:prstGeom prst="rect">
             <a:avLst/>
@@ -17945,7 +18026,7 @@
         <p:spPr bwMode="auto">
           <a:xfrm>
             <a:off x="7308304" y="3666703"/>
-            <a:ext cx="1835696" cy="1296144"/>
+            <a:ext cx="1709236" cy="1296144"/>
           </a:xfrm>
           <a:prstGeom prst="rect">
             <a:avLst/>
@@ -24837,82 +24918,9 @@
         </p:xfrm>
         <a:graphic>
           <a:graphicData uri="http://schemas.openxmlformats.org/presentationml/2006/ole">
-            <mc:AlternateContent xmlns:mc="http://schemas.openxmlformats.org/markup-compatibility/2006">
-              <mc:Choice xmlns:v="urn:schemas-microsoft-com:vml" Requires="v">
-                <p:oleObj spid="_x0000_s1035" name="Formel" r:id="rId4" imgW="26791560" imgH="6491160" progId="Equation.3">
-                  <p:embed/>
-                </p:oleObj>
-              </mc:Choice>
-              <mc:Fallback>
-                <p:oleObj name="Formel" r:id="rId4" imgW="26791560" imgH="6491160" progId="Equation.3">
-                  <p:embed/>
-                  <p:pic>
-                    <p:nvPicPr>
-                      <p:cNvPr id="0" name="Picture 7"/>
-                      <p:cNvPicPr>
-                        <a:picLocks noGrp="1" noChangeAspect="1" noChangeArrowheads="1"/>
-                      </p:cNvPicPr>
-                      <p:nvPr/>
-                    </p:nvPicPr>
-                    <p:blipFill>
-                      <a:blip r:embed="rId5">
-                        <a:extLst>
-                          <a:ext uri="{28A0092B-C50C-407E-A947-70E740481C1C}">
-                            <a14:useLocalDpi xmlns:a14="http://schemas.microsoft.com/office/drawing/2010/main" val="0"/>
-                          </a:ext>
-                        </a:extLst>
-                      </a:blip>
-                      <a:srcRect/>
-                      <a:stretch>
-                        <a:fillRect/>
-                      </a:stretch>
-                    </p:blipFill>
-                    <p:spPr bwMode="auto">
-                      <a:xfrm>
-                        <a:off x="6076950" y="1412776"/>
-                        <a:ext cx="1485900" cy="360363"/>
-                      </a:xfrm>
-                      <a:prstGeom prst="rect">
-                        <a:avLst/>
-                      </a:prstGeom>
-                      <a:noFill/>
-                      <a:ln>
-                        <a:noFill/>
-                      </a:ln>
-                      <a:effectLst/>
-                      <a:extLst>
-                        <a:ext uri="{909E8E84-426E-40DD-AFC4-6F175D3DCCD1}">
-                          <a14:hiddenFill xmlns:a14="http://schemas.microsoft.com/office/drawing/2010/main">
-                            <a:solidFill>
-                              <a:schemeClr val="accent1"/>
-                            </a:solidFill>
-                          </a14:hiddenFill>
-                        </a:ext>
-                        <a:ext uri="{91240B29-F687-4F45-9708-019B960494DF}">
-                          <a14:hiddenLine xmlns:a14="http://schemas.microsoft.com/office/drawing/2010/main" w="9525">
-                            <a:solidFill>
-                              <a:schemeClr val="tx1"/>
-                            </a:solidFill>
-                            <a:miter lim="800000"/>
-                            <a:headEnd/>
-                            <a:tailEnd/>
-                          </a14:hiddenLine>
-                        </a:ext>
-                        <a:ext uri="{AF507438-7753-43E0-B8FC-AC1667EBCBE1}">
-                          <a14:hiddenEffects xmlns:a14="http://schemas.microsoft.com/office/drawing/2010/main">
-                            <a:effectLst>
-                              <a:outerShdw dist="35921" dir="2700000" algn="ctr" rotWithShape="0">
-                                <a:schemeClr val="bg2"/>
-                              </a:outerShdw>
-                            </a:effectLst>
-                          </a14:hiddenEffects>
-                        </a:ext>
-                      </a:extLst>
-                    </p:spPr>
-                  </p:pic>
-                </p:oleObj>
-              </mc:Fallback>
-            </mc:AlternateContent>
+            <p:oleObj spid="_x0000_s1035" name="Formel" r:id="rId4" imgW="26791560" imgH="6491160" progId="Equation.3">
+              <p:embed/>
+            </p:oleObj>
           </a:graphicData>
         </a:graphic>
       </p:graphicFrame>
@@ -24932,82 +24940,9 @@
         </p:xfrm>
         <a:graphic>
           <a:graphicData uri="http://schemas.openxmlformats.org/presentationml/2006/ole">
-            <mc:AlternateContent xmlns:mc="http://schemas.openxmlformats.org/markup-compatibility/2006">
-              <mc:Choice xmlns:v="urn:schemas-microsoft-com:vml" Requires="v">
-                <p:oleObj spid="_x0000_s1036" name="Formel" r:id="rId6" imgW="38569320" imgH="14621400" progId="Equation.3">
-                  <p:embed/>
-                </p:oleObj>
-              </mc:Choice>
-              <mc:Fallback>
-                <p:oleObj name="Formel" r:id="rId6" imgW="38569320" imgH="14621400" progId="Equation.3">
-                  <p:embed/>
-                  <p:pic>
-                    <p:nvPicPr>
-                      <p:cNvPr id="0" name="Picture 8"/>
-                      <p:cNvPicPr>
-                        <a:picLocks noGrp="1" noChangeAspect="1" noChangeArrowheads="1"/>
-                      </p:cNvPicPr>
-                      <p:nvPr/>
-                    </p:nvPicPr>
-                    <p:blipFill>
-                      <a:blip r:embed="rId7">
-                        <a:extLst>
-                          <a:ext uri="{28A0092B-C50C-407E-A947-70E740481C1C}">
-                            <a14:useLocalDpi xmlns:a14="http://schemas.microsoft.com/office/drawing/2010/main" val="0"/>
-                          </a:ext>
-                        </a:extLst>
-                      </a:blip>
-                      <a:srcRect/>
-                      <a:stretch>
-                        <a:fillRect/>
-                      </a:stretch>
-                    </p:blipFill>
-                    <p:spPr bwMode="auto">
-                      <a:xfrm>
-                        <a:off x="1475656" y="1412776"/>
-                        <a:ext cx="2085590" cy="792088"/>
-                      </a:xfrm>
-                      <a:prstGeom prst="rect">
-                        <a:avLst/>
-                      </a:prstGeom>
-                      <a:noFill/>
-                      <a:ln>
-                        <a:noFill/>
-                      </a:ln>
-                      <a:effectLst/>
-                      <a:extLst>
-                        <a:ext uri="{909E8E84-426E-40DD-AFC4-6F175D3DCCD1}">
-                          <a14:hiddenFill xmlns:a14="http://schemas.microsoft.com/office/drawing/2010/main">
-                            <a:solidFill>
-                              <a:schemeClr val="accent1"/>
-                            </a:solidFill>
-                          </a14:hiddenFill>
-                        </a:ext>
-                        <a:ext uri="{91240B29-F687-4F45-9708-019B960494DF}">
-                          <a14:hiddenLine xmlns:a14="http://schemas.microsoft.com/office/drawing/2010/main" w="9525">
-                            <a:solidFill>
-                              <a:schemeClr val="tx1"/>
-                            </a:solidFill>
-                            <a:miter lim="800000"/>
-                            <a:headEnd/>
-                            <a:tailEnd/>
-                          </a14:hiddenLine>
-                        </a:ext>
-                        <a:ext uri="{AF507438-7753-43E0-B8FC-AC1667EBCBE1}">
-                          <a14:hiddenEffects xmlns:a14="http://schemas.microsoft.com/office/drawing/2010/main">
-                            <a:effectLst>
-                              <a:outerShdw dist="35921" dir="2700000" algn="ctr" rotWithShape="0">
-                                <a:schemeClr val="bg2"/>
-                              </a:outerShdw>
-                            </a:effectLst>
-                          </a14:hiddenEffects>
-                        </a:ext>
-                      </a:extLst>
-                    </p:spPr>
-                  </p:pic>
-                </p:oleObj>
-              </mc:Fallback>
-            </mc:AlternateContent>
+            <p:oleObj spid="_x0000_s1036" name="Formel" r:id="rId5" imgW="38569320" imgH="14621400" progId="Equation.3">
+              <p:embed/>
+            </p:oleObj>
           </a:graphicData>
         </a:graphic>
       </p:graphicFrame>
@@ -25432,8 +25367,8 @@
         </p:nvSpPr>
         <p:spPr bwMode="auto">
           <a:xfrm>
-            <a:off x="1259632" y="5394702"/>
-            <a:ext cx="7272808" cy="830997"/>
+            <a:off x="1259631" y="5394702"/>
+            <a:ext cx="7550993" cy="830997"/>
           </a:xfrm>
           <a:prstGeom prst="rect">
             <a:avLst/>
@@ -25489,7 +25424,7 @@
                   <a:srgbClr val="00B050"/>
                 </a:solidFill>
               </a:rPr>
-              <a:t>r</a:t>
+              <a:t>r </a:t>
             </a:r>
             <a:r>
               <a:rPr lang="de-DE" dirty="0" smtClean="0">
@@ -25497,7 +25432,15 @@
                   <a:srgbClr val="00B050"/>
                 </a:solidFill>
               </a:rPr>
-              <a:t>=0.2, </a:t>
+              <a:t>= 0.2</a:t>
+            </a:r>
+            <a:r>
+              <a:rPr lang="de-DE" dirty="0" smtClean="0">
+                <a:solidFill>
+                  <a:srgbClr val="00B050"/>
+                </a:solidFill>
+              </a:rPr>
+              <a:t>, </a:t>
             </a:r>
             <a:r>
               <a:rPr lang="de-DE" i="1" dirty="0" err="1" smtClean="0">
@@ -25508,12 +25451,28 @@
               <a:t>nt</a:t>
             </a:r>
             <a:r>
+              <a:rPr lang="de-DE" i="1" dirty="0" smtClean="0">
+                <a:solidFill>
+                  <a:srgbClr val="00B050"/>
+                </a:solidFill>
+              </a:rPr>
+              <a:t> </a:t>
+            </a:r>
+            <a:r>
               <a:rPr lang="de-DE" dirty="0" smtClean="0">
                 <a:solidFill>
                   <a:srgbClr val="00B050"/>
                 </a:solidFill>
               </a:rPr>
-              <a:t>=30, </a:t>
+              <a:t>= 30</a:t>
+            </a:r>
+            <a:r>
+              <a:rPr lang="de-DE" dirty="0" smtClean="0">
+                <a:solidFill>
+                  <a:srgbClr val="00B050"/>
+                </a:solidFill>
+              </a:rPr>
+              <a:t>, </a:t>
             </a:r>
             <a:r>
               <a:rPr lang="de-DE" i="1" dirty="0" smtClean="0">
@@ -25521,7 +25480,7 @@
                   <a:srgbClr val="00B050"/>
                 </a:solidFill>
               </a:rPr>
-              <a:t>N0</a:t>
+              <a:t>N0 </a:t>
             </a:r>
             <a:r>
               <a:rPr lang="de-DE" dirty="0" smtClean="0">
@@ -25529,7 +25488,7 @@
                   <a:srgbClr val="00B050"/>
                 </a:solidFill>
               </a:rPr>
-              <a:t>=2</a:t>
+              <a:t>= 2</a:t>
             </a:r>
             <a:endParaRPr lang="de-DE" dirty="0" smtClean="0">
               <a:solidFill>
@@ -25574,12 +25533,19 @@
               <a:t> </a:t>
             </a:r>
             <a:r>
+              <a:rPr lang="de-DE" dirty="0" smtClean="0"/>
+              <a:t/>
+            </a:r>
+            <a:br>
+              <a:rPr lang="de-DE" dirty="0" smtClean="0"/>
+            </a:br>
+            <a:r>
               <a:rPr lang="de-DE" i="1" dirty="0" smtClean="0">
                 <a:solidFill>
                   <a:srgbClr val="00B050"/>
                 </a:solidFill>
               </a:rPr>
-              <a:t>n0</a:t>
+              <a:t>n0 </a:t>
             </a:r>
             <a:r>
               <a:rPr lang="de-DE" dirty="0" smtClean="0">
@@ -25587,7 +25553,15 @@
                   <a:srgbClr val="00B050"/>
                 </a:solidFill>
               </a:rPr>
-              <a:t>=2 und </a:t>
+              <a:t>= 2 </a:t>
+            </a:r>
+            <a:r>
+              <a:rPr lang="de-DE" dirty="0" smtClean="0">
+                <a:solidFill>
+                  <a:srgbClr val="00B050"/>
+                </a:solidFill>
+              </a:rPr>
+              <a:t>und </a:t>
             </a:r>
             <a:r>
               <a:rPr lang="de-DE" i="1" dirty="0" smtClean="0">
@@ -25595,7 +25569,7 @@
                   <a:srgbClr val="00B050"/>
                 </a:solidFill>
               </a:rPr>
-              <a:t>n0</a:t>
+              <a:t>n0 </a:t>
             </a:r>
             <a:r>
               <a:rPr lang="de-DE" dirty="0" smtClean="0">
@@ -25603,7 +25577,15 @@
                   <a:srgbClr val="00B050"/>
                 </a:solidFill>
               </a:rPr>
-              <a:t>=4 vergleichen</a:t>
+              <a:t>= 4 </a:t>
+            </a:r>
+            <a:r>
+              <a:rPr lang="de-DE" dirty="0" smtClean="0">
+                <a:solidFill>
+                  <a:srgbClr val="00B050"/>
+                </a:solidFill>
+              </a:rPr>
+              <a:t>vergleichen</a:t>
             </a:r>
             <a:endParaRPr lang="de-DE" baseline="-25000" dirty="0"/>
           </a:p>
@@ -25618,7 +25600,7 @@
           <p:nvPr/>
         </p:nvPicPr>
         <p:blipFill>
-          <a:blip r:embed="rId8" cstate="print"/>
+          <a:blip r:embed="rId6" cstate="print"/>
           <a:srcRect/>
           <a:stretch>
             <a:fillRect/>

</xml_diff>